<commit_message>
Part one for Spring code for meetup
</commit_message>
<xml_diff>
--- a/Spring_Vs_Quarkus.pptx
+++ b/Spring_Vs_Quarkus.pptx
@@ -208,7 +208,7 @@
           <a:p>
             <a:fld id="{A56EB219-4127-E741-ADD4-00234EBFA567}" type="datetimeFigureOut">
               <a:rPr lang="en-PL" smtClean="0"/>
-              <a:t>14/12/2024</a:t>
+              <a:t>15/12/2024</a:t>
             </a:fld>
             <a:endParaRPr lang="en-PL"/>
           </a:p>
@@ -2334,7 +2334,7 @@
           <a:p>
             <a:fld id="{8F72BA41-EC5B-4197-BCC8-0FD2E523CD7A}" type="datetimeFigureOut">
               <a:rPr lang="en-US" smtClean="0"/>
-              <a:t>12/14/24</a:t>
+              <a:t>12/15/24</a:t>
             </a:fld>
             <a:endParaRPr lang="en-US"/>
           </a:p>
@@ -2537,7 +2537,7 @@
           <a:p>
             <a:fld id="{8F72BA41-EC5B-4197-BCC8-0FD2E523CD7A}" type="datetimeFigureOut">
               <a:rPr lang="en-US" smtClean="0"/>
-              <a:t>12/14/24</a:t>
+              <a:t>12/15/24</a:t>
             </a:fld>
             <a:endParaRPr lang="en-US"/>
           </a:p>
@@ -4258,7 +4258,7 @@
           <a:p>
             <a:fld id="{8F72BA41-EC5B-4197-BCC8-0FD2E523CD7A}" type="datetimeFigureOut">
               <a:rPr lang="en-US" smtClean="0"/>
-              <a:t>12/14/24</a:t>
+              <a:t>12/15/24</a:t>
             </a:fld>
             <a:endParaRPr lang="en-US"/>
           </a:p>
@@ -4457,7 +4457,7 @@
           <a:p>
             <a:fld id="{8F72BA41-EC5B-4197-BCC8-0FD2E523CD7A}" type="datetimeFigureOut">
               <a:rPr lang="en-US" smtClean="0"/>
-              <a:t>12/14/24</a:t>
+              <a:t>12/15/24</a:t>
             </a:fld>
             <a:endParaRPr lang="en-US"/>
           </a:p>
@@ -6247,7 +6247,7 @@
           <a:p>
             <a:fld id="{8F72BA41-EC5B-4197-BCC8-0FD2E523CD7A}" type="datetimeFigureOut">
               <a:rPr lang="en-US" smtClean="0"/>
-              <a:t>12/14/24</a:t>
+              <a:t>12/15/24</a:t>
             </a:fld>
             <a:endParaRPr lang="en-US"/>
           </a:p>
@@ -6520,7 +6520,7 @@
           <a:p>
             <a:fld id="{8F72BA41-EC5B-4197-BCC8-0FD2E523CD7A}" type="datetimeFigureOut">
               <a:rPr lang="en-US" smtClean="0"/>
-              <a:t>12/14/24</a:t>
+              <a:t>12/15/24</a:t>
             </a:fld>
             <a:endParaRPr lang="en-US"/>
           </a:p>
@@ -6940,7 +6940,7 @@
           <a:p>
             <a:fld id="{8F72BA41-EC5B-4197-BCC8-0FD2E523CD7A}" type="datetimeFigureOut">
               <a:rPr lang="en-US" smtClean="0"/>
-              <a:t>12/14/24</a:t>
+              <a:t>12/15/24</a:t>
             </a:fld>
             <a:endParaRPr lang="en-US"/>
           </a:p>
@@ -7096,7 +7096,7 @@
           <a:p>
             <a:fld id="{8F72BA41-EC5B-4197-BCC8-0FD2E523CD7A}" type="datetimeFigureOut">
               <a:rPr lang="en-US" smtClean="0"/>
-              <a:t>12/14/24</a:t>
+              <a:t>12/15/24</a:t>
             </a:fld>
             <a:endParaRPr lang="en-US"/>
           </a:p>
@@ -8664,7 +8664,7 @@
           <a:p>
             <a:fld id="{8F72BA41-EC5B-4197-BCC8-0FD2E523CD7A}" type="datetimeFigureOut">
               <a:rPr lang="en-US" smtClean="0"/>
-              <a:t>12/14/24</a:t>
+              <a:t>12/15/24</a:t>
             </a:fld>
             <a:endParaRPr lang="en-US"/>
           </a:p>
@@ -10515,7 +10515,7 @@
           <a:p>
             <a:fld id="{8F72BA41-EC5B-4197-BCC8-0FD2E523CD7A}" type="datetimeFigureOut">
               <a:rPr lang="en-US" smtClean="0"/>
-              <a:t>12/14/24</a:t>
+              <a:t>12/15/24</a:t>
             </a:fld>
             <a:endParaRPr lang="en-US"/>
           </a:p>
@@ -12328,7 +12328,7 @@
           <a:p>
             <a:fld id="{8F72BA41-EC5B-4197-BCC8-0FD2E523CD7A}" type="datetimeFigureOut">
               <a:rPr lang="en-US" smtClean="0"/>
-              <a:t>12/14/24</a:t>
+              <a:t>12/15/24</a:t>
             </a:fld>
             <a:endParaRPr lang="en-US"/>
           </a:p>
@@ -14022,7 +14022,7 @@
             <a:fld id="{8F72BA41-EC5B-4197-BCC8-0FD2E523CD7A}" type="datetimeFigureOut">
               <a:rPr lang="en-US" smtClean="0"/>
               <a:pPr/>
-              <a:t>12/14/24</a:t>
+              <a:t>12/15/24</a:t>
             </a:fld>
             <a:endParaRPr lang="en-US" dirty="0"/>
           </a:p>
@@ -16786,12 +16786,31 @@
           </a:p>
           <a:p>
             <a:r>
+              <a:rPr lang="en-US" dirty="0"/>
+              <a:t>Integration with </a:t>
+            </a:r>
+            <a:r>
               <a:rPr lang="en-US" dirty="0" err="1"/>
-              <a:t>Testcontainer</a:t>
+              <a:t>Testcontainers</a:t>
             </a:r>
             <a:r>
               <a:rPr lang="en-US" dirty="0"/>
-              <a:t> by default</a:t>
+              <a:t> on tests</a:t>
+            </a:r>
+          </a:p>
+          <a:p>
+            <a:pPr lvl="1"/>
+            <a:r>
+              <a:rPr lang="en-US" dirty="0"/>
+              <a:t>Requires us to clean up the </a:t>
+            </a:r>
+            <a:r>
+              <a:rPr lang="en-US" dirty="0" err="1"/>
+              <a:t>jdbc.url</a:t>
+            </a:r>
+            <a:r>
+              <a:rPr lang="en-US" dirty="0"/>
+              <a:t>, however only this change is needed</a:t>
             </a:r>
           </a:p>
           <a:p>

</xml_diff>